<commit_message>
Fixed split cart prices not being rounded to 2 decimal places
</commit_message>
<xml_diff>
--- a/Archive/CECS491A Presentation.pptx
+++ b/Archive/CECS491A Presentation.pptx
@@ -14,8 +14,10 @@
     <p:sldId id="280" r:id="rId11"/>
     <p:sldId id="281" r:id="rId12"/>
     <p:sldId id="282" r:id="rId13"/>
-    <p:sldId id="283" r:id="rId14"/>
-    <p:sldId id="267" r:id="rId15"/>
+    <p:sldId id="285" r:id="rId14"/>
+    <p:sldId id="286" r:id="rId15"/>
+    <p:sldId id="283" r:id="rId16"/>
+    <p:sldId id="267" r:id="rId17"/>
   </p:sldIdLst>
   <p:sldSz cx="12192000" cy="6858000"/>
   <p:notesSz cx="6858000" cy="9144000"/>
@@ -368,7 +370,7 @@
           <a:p>
             <a:fld id="{4AAD347D-5ACD-4C99-B74B-A9C85AD731AF}" type="datetimeFigureOut">
               <a:rPr lang="en-US" dirty="0"/>
-              <a:t>12/3/2024</a:t>
+              <a:t>12/5/2024</a:t>
             </a:fld>
             <a:endParaRPr lang="en-US"/>
           </a:p>
@@ -636,7 +638,7 @@
           <a:p>
             <a:fld id="{4509A250-FF31-4206-8172-F9D3106AACB1}" type="datetimeFigureOut">
               <a:rPr lang="en-US" dirty="0"/>
-              <a:t>12/3/2024</a:t>
+              <a:t>12/5/2024</a:t>
             </a:fld>
             <a:endParaRPr lang="en-US"/>
           </a:p>
@@ -824,7 +826,7 @@
           <a:p>
             <a:fld id="{4509A250-FF31-4206-8172-F9D3106AACB1}" type="datetimeFigureOut">
               <a:rPr lang="en-US" dirty="0"/>
-              <a:t>12/3/2024</a:t>
+              <a:t>12/5/2024</a:t>
             </a:fld>
             <a:endParaRPr lang="en-US"/>
           </a:p>
@@ -1091,7 +1093,7 @@
           <a:p>
             <a:fld id="{4509A250-FF31-4206-8172-F9D3106AACB1}" type="datetimeFigureOut">
               <a:rPr lang="en-US" dirty="0"/>
-              <a:t>12/3/2024</a:t>
+              <a:t>12/5/2024</a:t>
             </a:fld>
             <a:endParaRPr lang="en-US"/>
           </a:p>
@@ -1426,7 +1428,7 @@
           <a:p>
             <a:fld id="{4509A250-FF31-4206-8172-F9D3106AACB1}" type="datetimeFigureOut">
               <a:rPr lang="en-US" dirty="0"/>
-              <a:t>12/3/2024</a:t>
+              <a:t>12/5/2024</a:t>
             </a:fld>
             <a:endParaRPr lang="en-US"/>
           </a:p>
@@ -2043,7 +2045,7 @@
           <a:p>
             <a:fld id="{4509A250-FF31-4206-8172-F9D3106AACB1}" type="datetimeFigureOut">
               <a:rPr lang="en-US" dirty="0"/>
-              <a:t>12/3/2024</a:t>
+              <a:t>12/5/2024</a:t>
             </a:fld>
             <a:endParaRPr lang="en-US"/>
           </a:p>
@@ -2894,7 +2896,7 @@
           <a:p>
             <a:fld id="{4509A250-FF31-4206-8172-F9D3106AACB1}" type="datetimeFigureOut">
               <a:rPr lang="en-US" dirty="0"/>
-              <a:t>12/3/2024</a:t>
+              <a:t>12/5/2024</a:t>
             </a:fld>
             <a:endParaRPr lang="en-US"/>
           </a:p>
@@ -3057,7 +3059,7 @@
           <a:p>
             <a:fld id="{4509A250-FF31-4206-8172-F9D3106AACB1}" type="datetimeFigureOut">
               <a:rPr lang="en-US" dirty="0"/>
-              <a:t>12/3/2024</a:t>
+              <a:t>12/5/2024</a:t>
             </a:fld>
             <a:endParaRPr lang="en-US"/>
           </a:p>
@@ -3230,7 +3232,7 @@
           <a:p>
             <a:fld id="{4509A250-FF31-4206-8172-F9D3106AACB1}" type="datetimeFigureOut">
               <a:rPr lang="en-US" dirty="0"/>
-              <a:t>12/3/2024</a:t>
+              <a:t>12/5/2024</a:t>
             </a:fld>
             <a:endParaRPr lang="en-US"/>
           </a:p>
@@ -3393,7 +3395,7 @@
           <a:p>
             <a:fld id="{4509A250-FF31-4206-8172-F9D3106AACB1}" type="datetimeFigureOut">
               <a:rPr lang="en-US" dirty="0"/>
-              <a:t>12/3/2024</a:t>
+              <a:t>12/5/2024</a:t>
             </a:fld>
             <a:endParaRPr lang="en-US"/>
           </a:p>
@@ -3634,7 +3636,7 @@
           <a:p>
             <a:fld id="{9796027F-7875-4030-9381-8BD8C4F21935}" type="datetimeFigureOut">
               <a:rPr lang="en-US" dirty="0"/>
-              <a:t>12/3/2024</a:t>
+              <a:t>12/5/2024</a:t>
             </a:fld>
             <a:endParaRPr lang="en-US"/>
           </a:p>
@@ -3918,7 +3920,7 @@
           <a:p>
             <a:fld id="{9796027F-7875-4030-9381-8BD8C4F21935}" type="datetimeFigureOut">
               <a:rPr lang="en-US" dirty="0"/>
-              <a:t>12/3/2024</a:t>
+              <a:t>12/5/2024</a:t>
             </a:fld>
             <a:endParaRPr lang="en-US"/>
           </a:p>
@@ -4354,7 +4356,7 @@
           <a:p>
             <a:fld id="{9796027F-7875-4030-9381-8BD8C4F21935}" type="datetimeFigureOut">
               <a:rPr lang="en-US" dirty="0"/>
-              <a:t>12/3/2024</a:t>
+              <a:t>12/5/2024</a:t>
             </a:fld>
             <a:endParaRPr lang="en-US"/>
           </a:p>
@@ -4466,7 +4468,7 @@
           <a:p>
             <a:fld id="{4509A250-FF31-4206-8172-F9D3106AACB1}" type="datetimeFigureOut">
               <a:rPr lang="en-US" dirty="0"/>
-              <a:t>12/3/2024</a:t>
+              <a:t>12/5/2024</a:t>
             </a:fld>
             <a:endParaRPr lang="en-US"/>
           </a:p>
@@ -4556,7 +4558,7 @@
           <a:p>
             <a:fld id="{4509A250-FF31-4206-8172-F9D3106AACB1}" type="datetimeFigureOut">
               <a:rPr lang="en-US" dirty="0"/>
-              <a:t>12/3/2024</a:t>
+              <a:t>12/5/2024</a:t>
             </a:fld>
             <a:endParaRPr lang="en-US"/>
           </a:p>
@@ -4828,7 +4830,7 @@
           <a:p>
             <a:fld id="{4509A250-FF31-4206-8172-F9D3106AACB1}" type="datetimeFigureOut">
               <a:rPr lang="en-US" dirty="0"/>
-              <a:t>12/3/2024</a:t>
+              <a:t>12/5/2024</a:t>
             </a:fld>
             <a:endParaRPr lang="en-US"/>
           </a:p>
@@ -5096,7 +5098,7 @@
           <a:p>
             <a:fld id="{4509A250-FF31-4206-8172-F9D3106AACB1}" type="datetimeFigureOut">
               <a:rPr lang="en-US" dirty="0"/>
-              <a:t>12/3/2024</a:t>
+              <a:t>12/5/2024</a:t>
             </a:fld>
             <a:endParaRPr lang="en-US"/>
           </a:p>
@@ -5518,7 +5520,7 @@
           <a:p>
             <a:fld id="{4AAD347D-5ACD-4C99-B74B-A9C85AD731AF}" type="datetimeFigureOut">
               <a:rPr lang="en-US" dirty="0"/>
-              <a:t>12/3/2024</a:t>
+              <a:t>12/5/2024</a:t>
             </a:fld>
             <a:endParaRPr lang="en-US"/>
           </a:p>
@@ -7347,6 +7349,215 @@
       </p:grpSpPr>
       <p:sp>
         <p:nvSpPr>
+          <p:cNvPr id="2" name="Title 1">
+            <a:extLst>
+              <a:ext uri="{FF2B5EF4-FFF2-40B4-BE49-F238E27FC236}">
+                <a16:creationId xmlns:a16="http://schemas.microsoft.com/office/drawing/2014/main" id="{911ACBE7-F2D7-1C8D-ECD8-EF5A4CFB9BE5}"/>
+              </a:ext>
+            </a:extLst>
+          </p:cNvPr>
+          <p:cNvSpPr>
+            <a:spLocks noGrp="1"/>
+          </p:cNvSpPr>
+          <p:nvPr>
+            <p:ph type="title"/>
+          </p:nvPr>
+        </p:nvSpPr>
+        <p:spPr/>
+        <p:txBody>
+          <a:bodyPr/>
+          <a:lstStyle/>
+          <a:p>
+            <a:r>
+              <a:rPr lang="en-US" dirty="0"/>
+              <a:t>Product Delivery / Installation</a:t>
+            </a:r>
+          </a:p>
+        </p:txBody>
+      </p:sp>
+      <p:sp>
+        <p:nvSpPr>
+          <p:cNvPr id="3" name="Content Placeholder 2">
+            <a:extLst>
+              <a:ext uri="{FF2B5EF4-FFF2-40B4-BE49-F238E27FC236}">
+                <a16:creationId xmlns:a16="http://schemas.microsoft.com/office/drawing/2014/main" id="{5CF7C072-06EC-A4C8-AC6C-9A7D022439BC}"/>
+              </a:ext>
+            </a:extLst>
+          </p:cNvPr>
+          <p:cNvSpPr>
+            <a:spLocks noGrp="1"/>
+          </p:cNvSpPr>
+          <p:nvPr>
+            <p:ph idx="1"/>
+          </p:nvPr>
+        </p:nvSpPr>
+        <p:spPr/>
+        <p:txBody>
+          <a:bodyPr/>
+          <a:lstStyle/>
+          <a:p>
+            <a:r>
+              <a:rPr lang="en-US" dirty="0"/>
+              <a:t>We would give the customer the choice to self host or allow us to host it for them</a:t>
+            </a:r>
+          </a:p>
+          <a:p>
+            <a:r>
+              <a:rPr lang="en-US" dirty="0"/>
+              <a:t>The database could be either hosted on our end or by the customer using their own custom database solution as our website is modular</a:t>
+            </a:r>
+          </a:p>
+          <a:p>
+            <a:r>
+              <a:rPr lang="en-US" dirty="0"/>
+              <a:t>Customer would give us a document of what they wanted on the website as well as an idea of what they wanted it to look like</a:t>
+            </a:r>
+          </a:p>
+          <a:p>
+            <a:r>
+              <a:rPr lang="en-US" dirty="0"/>
+              <a:t>After we got these documents we create their website, after they have confirmed they like the design we host it for them or remote into their server to setup the hosting for them locally</a:t>
+            </a:r>
+          </a:p>
+        </p:txBody>
+      </p:sp>
+    </p:spTree>
+    <p:extLst>
+      <p:ext uri="{BB962C8B-B14F-4D97-AF65-F5344CB8AC3E}">
+        <p14:creationId xmlns:p14="http://schemas.microsoft.com/office/powerpoint/2010/main" val="3782472456"/>
+      </p:ext>
+    </p:extLst>
+  </p:cSld>
+  <p:clrMapOvr>
+    <a:masterClrMapping/>
+  </p:clrMapOvr>
+</p:sld>
+</file>
+
+<file path=ppt/slides/slide11.xml><?xml version="1.0" encoding="utf-8"?>
+<p:sld xmlns:a="http://schemas.openxmlformats.org/drawingml/2006/main" xmlns:r="http://schemas.openxmlformats.org/officeDocument/2006/relationships" xmlns:p="http://schemas.openxmlformats.org/presentationml/2006/main">
+  <p:cSld>
+    <p:spTree>
+      <p:nvGrpSpPr>
+        <p:cNvPr id="1" name=""/>
+        <p:cNvGrpSpPr/>
+        <p:nvPr/>
+      </p:nvGrpSpPr>
+      <p:grpSpPr>
+        <a:xfrm>
+          <a:off x="0" y="0"/>
+          <a:ext cx="0" cy="0"/>
+          <a:chOff x="0" y="0"/>
+          <a:chExt cx="0" cy="0"/>
+        </a:xfrm>
+      </p:grpSpPr>
+      <p:sp>
+        <p:nvSpPr>
+          <p:cNvPr id="2" name="Title 1">
+            <a:extLst>
+              <a:ext uri="{FF2B5EF4-FFF2-40B4-BE49-F238E27FC236}">
+                <a16:creationId xmlns:a16="http://schemas.microsoft.com/office/drawing/2014/main" id="{149A7F90-EEBC-1608-180C-52EE9765BCFB}"/>
+              </a:ext>
+            </a:extLst>
+          </p:cNvPr>
+          <p:cNvSpPr>
+            <a:spLocks noGrp="1"/>
+          </p:cNvSpPr>
+          <p:nvPr>
+            <p:ph type="title"/>
+          </p:nvPr>
+        </p:nvSpPr>
+        <p:spPr/>
+        <p:txBody>
+          <a:bodyPr/>
+          <a:lstStyle/>
+          <a:p>
+            <a:r>
+              <a:rPr lang="en-US" dirty="0"/>
+              <a:t>How is our website profitable?	</a:t>
+            </a:r>
+          </a:p>
+        </p:txBody>
+      </p:sp>
+      <p:sp>
+        <p:nvSpPr>
+          <p:cNvPr id="3" name="Content Placeholder 2">
+            <a:extLst>
+              <a:ext uri="{FF2B5EF4-FFF2-40B4-BE49-F238E27FC236}">
+                <a16:creationId xmlns:a16="http://schemas.microsoft.com/office/drawing/2014/main" id="{1287B57E-699C-6023-A8D1-81FAFA4BBE15}"/>
+              </a:ext>
+            </a:extLst>
+          </p:cNvPr>
+          <p:cNvSpPr>
+            <a:spLocks noGrp="1"/>
+          </p:cNvSpPr>
+          <p:nvPr>
+            <p:ph idx="1"/>
+          </p:nvPr>
+        </p:nvSpPr>
+        <p:spPr/>
+        <p:txBody>
+          <a:bodyPr/>
+          <a:lstStyle/>
+          <a:p>
+            <a:r>
+              <a:rPr lang="en-US" dirty="0"/>
+              <a:t>We will have a lower initial cost to setup the website based on the customers needs</a:t>
+            </a:r>
+          </a:p>
+          <a:p>
+            <a:r>
+              <a:rPr lang="en-US" dirty="0"/>
+              <a:t>We will then charge for supporting the website</a:t>
+            </a:r>
+          </a:p>
+          <a:p>
+            <a:pPr lvl="1"/>
+            <a:r>
+              <a:rPr lang="en-US" dirty="0"/>
+              <a:t>For example if they found a bug they would call us and we would remotely fix it for them</a:t>
+            </a:r>
+          </a:p>
+          <a:p>
+            <a:r>
+              <a:rPr lang="en-US" dirty="0"/>
+              <a:t>The main focus of our income would be updates and support of the product rather than selling the product itself</a:t>
+            </a:r>
+          </a:p>
+        </p:txBody>
+      </p:sp>
+    </p:spTree>
+    <p:extLst>
+      <p:ext uri="{BB962C8B-B14F-4D97-AF65-F5344CB8AC3E}">
+        <p14:creationId xmlns:p14="http://schemas.microsoft.com/office/powerpoint/2010/main" val="3042675125"/>
+      </p:ext>
+    </p:extLst>
+  </p:cSld>
+  <p:clrMapOvr>
+    <a:masterClrMapping/>
+  </p:clrMapOvr>
+</p:sld>
+</file>
+
+<file path=ppt/slides/slide12.xml><?xml version="1.0" encoding="utf-8"?>
+<p:sld xmlns:a="http://schemas.openxmlformats.org/drawingml/2006/main" xmlns:r="http://schemas.openxmlformats.org/officeDocument/2006/relationships" xmlns:p="http://schemas.openxmlformats.org/presentationml/2006/main">
+  <p:cSld>
+    <p:spTree>
+      <p:nvGrpSpPr>
+        <p:cNvPr id="1" name=""/>
+        <p:cNvGrpSpPr/>
+        <p:nvPr/>
+      </p:nvGrpSpPr>
+      <p:grpSpPr>
+        <a:xfrm>
+          <a:off x="0" y="0"/>
+          <a:ext cx="0" cy="0"/>
+          <a:chOff x="0" y="0"/>
+          <a:chExt cx="0" cy="0"/>
+        </a:xfrm>
+      </p:grpSpPr>
+      <p:sp>
+        <p:nvSpPr>
           <p:cNvPr id="2" name="タイトル 1">
             <a:extLst>
               <a:ext uri="{FF2B5EF4-FFF2-40B4-BE49-F238E27FC236}">
@@ -7476,7 +7687,7 @@
 </p:sld>
 </file>
 
-<file path=ppt/slides/slide11.xml><?xml version="1.0" encoding="utf-8"?>
+<file path=ppt/slides/slide13.xml><?xml version="1.0" encoding="utf-8"?>
 <p:sld xmlns:a="http://schemas.openxmlformats.org/drawingml/2006/main" xmlns:r="http://schemas.openxmlformats.org/officeDocument/2006/relationships" xmlns:p="http://schemas.openxmlformats.org/presentationml/2006/main">
   <p:cSld>
     <p:spTree>
@@ -9086,6 +9297,12 @@
 </file>
 
 <file path=customXml/item1.xml><?xml version="1.0" encoding="utf-8"?>
+<p:properties xmlns:p="http://schemas.microsoft.com/office/2006/metadata/properties" xmlns:xsi="http://www.w3.org/2001/XMLSchema-instance" xmlns:pc="http://schemas.microsoft.com/office/infopath/2007/PartnerControls">
+  <documentManagement/>
+</p:properties>
+</file>
+
+<file path=customXml/item2.xml><?xml version="1.0" encoding="utf-8"?>
 <ct:contentTypeSchema xmlns:ct="http://schemas.microsoft.com/office/2006/metadata/contentType" xmlns:ma="http://schemas.microsoft.com/office/2006/metadata/properties/metaAttributes" ct:_="" ma:_="" ma:contentTypeName="Document" ma:contentTypeID="0x010100FFABBDA74B3AA542BB521D423810106B" ma:contentTypeVersion="8" ma:contentTypeDescription="Create a new document." ma:contentTypeScope="" ma:versionID="595201557ccc102e7edad97534e2bcd4">
   <xsd:schema xmlns:xsd="http://www.w3.org/2001/XMLSchema" xmlns:xs="http://www.w3.org/2001/XMLSchema" xmlns:p="http://schemas.microsoft.com/office/2006/metadata/properties" xmlns:ns2="929e17a7-aa82-4055-9192-9c7fed335ad8" targetNamespace="http://schemas.microsoft.com/office/2006/metadata/properties" ma:root="true" ma:fieldsID="a310b8f75963f443df9db03c3a836023" ns2:_="">
     <xsd:import namespace="929e17a7-aa82-4055-9192-9c7fed335ad8"/>
@@ -9253,12 +9470,6 @@
 </ct:contentTypeSchema>
 </file>
 
-<file path=customXml/item2.xml><?xml version="1.0" encoding="utf-8"?>
-<p:properties xmlns:p="http://schemas.microsoft.com/office/2006/metadata/properties" xmlns:xsi="http://www.w3.org/2001/XMLSchema-instance" xmlns:pc="http://schemas.microsoft.com/office/infopath/2007/PartnerControls">
-  <documentManagement/>
-</p:properties>
-</file>
-
 <file path=customXml/item3.xml><?xml version="1.0" encoding="utf-8"?>
 <?mso-contentType ?>
 <FormTemplates xmlns="http://schemas.microsoft.com/sharepoint/v3/contenttype/forms">
@@ -9269,6 +9480,22 @@
 </file>
 
 <file path=customXml/itemProps1.xml><?xml version="1.0" encoding="utf-8"?>
+<ds:datastoreItem xmlns:ds="http://schemas.openxmlformats.org/officeDocument/2006/customXml" ds:itemID="{F06563F5-37E1-40FF-8DFF-0CA672B6BF62}">
+  <ds:schemaRefs>
+    <ds:schemaRef ds:uri="http://purl.org/dc/dcmitype/"/>
+    <ds:schemaRef ds:uri="http://schemas.microsoft.com/office/infopath/2007/PartnerControls"/>
+    <ds:schemaRef ds:uri="http://schemas.microsoft.com/office/2006/metadata/properties"/>
+    <ds:schemaRef ds:uri="http://schemas.microsoft.com/office/2006/documentManagement/types"/>
+    <ds:schemaRef ds:uri="http://purl.org/dc/elements/1.1/"/>
+    <ds:schemaRef ds:uri="http://www.w3.org/XML/1998/namespace"/>
+    <ds:schemaRef ds:uri="http://purl.org/dc/terms/"/>
+    <ds:schemaRef ds:uri="http://schemas.openxmlformats.org/package/2006/metadata/core-properties"/>
+    <ds:schemaRef ds:uri="929e17a7-aa82-4055-9192-9c7fed335ad8"/>
+  </ds:schemaRefs>
+</ds:datastoreItem>
+</file>
+
+<file path=customXml/itemProps2.xml><?xml version="1.0" encoding="utf-8"?>
 <ds:datastoreItem xmlns:ds="http://schemas.openxmlformats.org/officeDocument/2006/customXml" ds:itemID="{7CB5CCC0-4D4C-4CBB-BF44-69897E072811}">
   <ds:schemaRefs>
     <ds:schemaRef ds:uri="929e17a7-aa82-4055-9192-9c7fed335ad8"/>
@@ -9286,22 +9513,6 @@
 </ds:datastoreItem>
 </file>
 
-<file path=customXml/itemProps2.xml><?xml version="1.0" encoding="utf-8"?>
-<ds:datastoreItem xmlns:ds="http://schemas.openxmlformats.org/officeDocument/2006/customXml" ds:itemID="{F06563F5-37E1-40FF-8DFF-0CA672B6BF62}">
-  <ds:schemaRefs>
-    <ds:schemaRef ds:uri="http://purl.org/dc/dcmitype/"/>
-    <ds:schemaRef ds:uri="http://schemas.microsoft.com/office/infopath/2007/PartnerControls"/>
-    <ds:schemaRef ds:uri="http://schemas.microsoft.com/office/2006/metadata/properties"/>
-    <ds:schemaRef ds:uri="http://schemas.microsoft.com/office/2006/documentManagement/types"/>
-    <ds:schemaRef ds:uri="http://purl.org/dc/elements/1.1/"/>
-    <ds:schemaRef ds:uri="http://www.w3.org/XML/1998/namespace"/>
-    <ds:schemaRef ds:uri="http://purl.org/dc/terms/"/>
-    <ds:schemaRef ds:uri="http://schemas.openxmlformats.org/package/2006/metadata/core-properties"/>
-    <ds:schemaRef ds:uri="929e17a7-aa82-4055-9192-9c7fed335ad8"/>
-  </ds:schemaRefs>
-</ds:datastoreItem>
-</file>
-
 <file path=customXml/itemProps3.xml><?xml version="1.0" encoding="utf-8"?>
 <ds:datastoreItem xmlns:ds="http://schemas.openxmlformats.org/officeDocument/2006/customXml" ds:itemID="{B6168AEF-7258-4D02-A1E8-7DC203F0D881}">
   <ds:schemaRefs>

</xml_diff>